<commit_message>
new code file had been added and powerpoint had been updated
</commit_message>
<xml_diff>
--- a/python/learn_python.pptx
+++ b/python/learn_python.pptx
@@ -10,6 +10,8 @@
     <p:sldId id="259" r:id="rId4"/>
     <p:sldId id="260" r:id="rId5"/>
     <p:sldId id="261" r:id="rId6"/>
+    <p:sldId id="262" r:id="rId7"/>
+    <p:sldId id="263" r:id="rId8"/>
   </p:sldIdLst>
   <p:sldSz cx="12192000" cy="6858000"/>
   <p:notesSz cx="6858000" cy="9144000"/>
@@ -4692,6 +4694,545 @@
     <p:extLst>
       <p:ext uri="{BB962C8B-B14F-4D97-AF65-F5344CB8AC3E}">
         <p14:creationId xmlns:p14="http://schemas.microsoft.com/office/powerpoint/2010/main" val="3228866381"/>
+      </p:ext>
+    </p:extLst>
+  </p:cSld>
+  <p:clrMapOvr>
+    <a:masterClrMapping/>
+  </p:clrMapOvr>
+</p:sld>
+</file>
+
+<file path=ppt/slides/slide6.xml><?xml version="1.0" encoding="utf-8"?>
+<p:sld xmlns:a="http://schemas.openxmlformats.org/drawingml/2006/main" xmlns:r="http://schemas.openxmlformats.org/officeDocument/2006/relationships" xmlns:p="http://schemas.openxmlformats.org/presentationml/2006/main">
+  <p:cSld>
+    <p:spTree>
+      <p:nvGrpSpPr>
+        <p:cNvPr id="1" name=""/>
+        <p:cNvGrpSpPr/>
+        <p:nvPr/>
+      </p:nvGrpSpPr>
+      <p:grpSpPr>
+        <a:xfrm>
+          <a:off x="0" y="0"/>
+          <a:ext cx="0" cy="0"/>
+          <a:chOff x="0" y="0"/>
+          <a:chExt cx="0" cy="0"/>
+        </a:xfrm>
+      </p:grpSpPr>
+      <p:sp>
+        <p:nvSpPr>
+          <p:cNvPr id="2" name="Title 1">
+            <a:extLst>
+              <a:ext uri="{FF2B5EF4-FFF2-40B4-BE49-F238E27FC236}">
+                <a16:creationId xmlns:a16="http://schemas.microsoft.com/office/drawing/2014/main" id="{53BB8D71-026C-7299-55F3-EF65110D9AAE}"/>
+              </a:ext>
+            </a:extLst>
+          </p:cNvPr>
+          <p:cNvSpPr>
+            <a:spLocks noGrp="1"/>
+          </p:cNvSpPr>
+          <p:nvPr>
+            <p:ph type="title"/>
+          </p:nvPr>
+        </p:nvSpPr>
+        <p:spPr>
+          <a:xfrm>
+            <a:off x="526262" y="286045"/>
+            <a:ext cx="8987193" cy="1018032"/>
+          </a:xfrm>
+        </p:spPr>
+        <p:txBody>
+          <a:bodyPr/>
+          <a:lstStyle/>
+          <a:p>
+            <a:pPr algn="r" rtl="1"/>
+            <a:r>
+              <a:rPr lang="fa-IR" dirty="0"/>
+              <a:t>استفاده از متابخانه </a:t>
+            </a:r>
+            <a:r>
+              <a:rPr lang="en-US" dirty="0"/>
+              <a:t>datetime </a:t>
+            </a:r>
+            <a:r>
+              <a:rPr lang="fa-IR" dirty="0"/>
+              <a:t> </a:t>
+            </a:r>
+            <a:r>
+              <a:rPr lang="en-US" sz="2400" dirty="0"/>
+              <a:t>(</a:t>
+            </a:r>
+            <a:r>
+              <a:rPr lang="en-US" sz="2400" dirty="0" err="1"/>
+              <a:t>datetime,now</a:t>
+            </a:r>
+            <a:r>
+              <a:rPr lang="en-US" sz="2400" dirty="0"/>
+              <a:t>)</a:t>
+            </a:r>
+            <a:endParaRPr lang="en-US" dirty="0"/>
+          </a:p>
+        </p:txBody>
+      </p:sp>
+      <p:sp>
+        <p:nvSpPr>
+          <p:cNvPr id="3" name="Content Placeholder 2">
+            <a:extLst>
+              <a:ext uri="{FF2B5EF4-FFF2-40B4-BE49-F238E27FC236}">
+                <a16:creationId xmlns:a16="http://schemas.microsoft.com/office/drawing/2014/main" id="{607A797D-EFF0-FA66-1952-E4C0F7E1755B}"/>
+              </a:ext>
+            </a:extLst>
+          </p:cNvPr>
+          <p:cNvSpPr>
+            <a:spLocks noGrp="1"/>
+          </p:cNvSpPr>
+          <p:nvPr>
+            <p:ph idx="1"/>
+          </p:nvPr>
+        </p:nvSpPr>
+        <p:spPr/>
+        <p:txBody>
+          <a:bodyPr>
+            <a:normAutofit/>
+          </a:bodyPr>
+          <a:lstStyle/>
+          <a:p>
+            <a:pPr algn="r" rtl="1"/>
+            <a:r>
+              <a:rPr lang="fa-IR" sz="2400" dirty="0">
+                <a:solidFill>
+                  <a:schemeClr val="tx1"/>
+                </a:solidFill>
+              </a:rPr>
+              <a:t>تابع </a:t>
+            </a:r>
+            <a:r>
+              <a:rPr lang="en-US" sz="2400" dirty="0">
+                <a:solidFill>
+                  <a:schemeClr val="tx1"/>
+                </a:solidFill>
+              </a:rPr>
+              <a:t>now</a:t>
+            </a:r>
+            <a:r>
+              <a:rPr lang="fa-IR" sz="2400" dirty="0">
+                <a:solidFill>
+                  <a:schemeClr val="tx1"/>
+                </a:solidFill>
+              </a:rPr>
+              <a:t> : با این تابع می توان مقدار دقیق زمان رو بدست آورد (تابع درونی </a:t>
+            </a:r>
+            <a:r>
+              <a:rPr lang="en-US" sz="2400" dirty="0">
+                <a:solidFill>
+                  <a:schemeClr val="tx1"/>
+                </a:solidFill>
+              </a:rPr>
+              <a:t>datetime</a:t>
+            </a:r>
+            <a:r>
+              <a:rPr lang="fa-IR" sz="2400" dirty="0">
+                <a:solidFill>
+                  <a:schemeClr val="tx1"/>
+                </a:solidFill>
+              </a:rPr>
+              <a:t> )</a:t>
+            </a:r>
+          </a:p>
+          <a:p>
+            <a:pPr algn="r" rtl="1"/>
+            <a:r>
+              <a:rPr lang="fa-IR" sz="2400" dirty="0">
+                <a:solidFill>
+                  <a:schemeClr val="tx1"/>
+                </a:solidFill>
+              </a:rPr>
+              <a:t>تابع </a:t>
+            </a:r>
+            <a:r>
+              <a:rPr lang="en-US" sz="2400" dirty="0">
+                <a:solidFill>
+                  <a:schemeClr val="tx1"/>
+                </a:solidFill>
+              </a:rPr>
+              <a:t>datetime</a:t>
+            </a:r>
+            <a:r>
+              <a:rPr lang="fa-IR" sz="2400" dirty="0">
+                <a:solidFill>
+                  <a:schemeClr val="tx1"/>
+                </a:solidFill>
+              </a:rPr>
+              <a:t> : ترکیب دو دیتا تایپ </a:t>
+            </a:r>
+            <a:r>
+              <a:rPr lang="en-US" sz="2400" dirty="0">
+                <a:solidFill>
+                  <a:schemeClr val="tx1"/>
+                </a:solidFill>
+              </a:rPr>
+              <a:t>time </a:t>
+            </a:r>
+            <a:r>
+              <a:rPr lang="fa-IR" sz="2400" dirty="0">
+                <a:solidFill>
+                  <a:schemeClr val="tx1"/>
+                </a:solidFill>
+              </a:rPr>
+              <a:t> و </a:t>
+            </a:r>
+            <a:r>
+              <a:rPr lang="en-US" sz="2400" dirty="0">
+                <a:solidFill>
+                  <a:schemeClr val="tx1"/>
+                </a:solidFill>
+              </a:rPr>
+              <a:t>date</a:t>
+            </a:r>
+          </a:p>
+          <a:p>
+            <a:pPr marL="0" indent="0" algn="r" rtl="1">
+              <a:buNone/>
+            </a:pPr>
+            <a:endParaRPr lang="en-US" sz="2400" dirty="0">
+              <a:solidFill>
+                <a:schemeClr val="tx1"/>
+              </a:solidFill>
+            </a:endParaRPr>
+          </a:p>
+        </p:txBody>
+      </p:sp>
+      <p:pic>
+        <p:nvPicPr>
+          <p:cNvPr id="6" name="Picture 5">
+            <a:extLst>
+              <a:ext uri="{FF2B5EF4-FFF2-40B4-BE49-F238E27FC236}">
+                <a16:creationId xmlns:a16="http://schemas.microsoft.com/office/drawing/2014/main" id="{99244F4F-C4A3-C754-B92C-35C48B7A3320}"/>
+              </a:ext>
+            </a:extLst>
+          </p:cNvPr>
+          <p:cNvPicPr>
+            <a:picLocks noChangeAspect="1"/>
+          </p:cNvPicPr>
+          <p:nvPr/>
+        </p:nvPicPr>
+        <p:blipFill rotWithShape="1">
+          <a:blip r:embed="rId2"/>
+          <a:srcRect l="52272" t="28148" r="1061" b="27138"/>
+          <a:stretch/>
+        </p:blipFill>
+        <p:spPr>
+          <a:xfrm>
+            <a:off x="2586182" y="2770909"/>
+            <a:ext cx="6567053" cy="3801046"/>
+          </a:xfrm>
+          <a:prstGeom prst="rect">
+            <a:avLst/>
+          </a:prstGeom>
+        </p:spPr>
+      </p:pic>
+    </p:spTree>
+    <p:extLst>
+      <p:ext uri="{BB962C8B-B14F-4D97-AF65-F5344CB8AC3E}">
+        <p14:creationId xmlns:p14="http://schemas.microsoft.com/office/powerpoint/2010/main" val="2459599862"/>
+      </p:ext>
+    </p:extLst>
+  </p:cSld>
+  <p:clrMapOvr>
+    <a:masterClrMapping/>
+  </p:clrMapOvr>
+</p:sld>
+</file>
+
+<file path=ppt/slides/slide7.xml><?xml version="1.0" encoding="utf-8"?>
+<p:sld xmlns:a="http://schemas.openxmlformats.org/drawingml/2006/main" xmlns:r="http://schemas.openxmlformats.org/officeDocument/2006/relationships" xmlns:p="http://schemas.openxmlformats.org/presentationml/2006/main">
+  <p:cSld>
+    <p:spTree>
+      <p:nvGrpSpPr>
+        <p:cNvPr id="1" name=""/>
+        <p:cNvGrpSpPr/>
+        <p:nvPr/>
+      </p:nvGrpSpPr>
+      <p:grpSpPr>
+        <a:xfrm>
+          <a:off x="0" y="0"/>
+          <a:ext cx="0" cy="0"/>
+          <a:chOff x="0" y="0"/>
+          <a:chExt cx="0" cy="0"/>
+        </a:xfrm>
+      </p:grpSpPr>
+      <p:sp>
+        <p:nvSpPr>
+          <p:cNvPr id="2" name="Title 1">
+            <a:extLst>
+              <a:ext uri="{FF2B5EF4-FFF2-40B4-BE49-F238E27FC236}">
+                <a16:creationId xmlns:a16="http://schemas.microsoft.com/office/drawing/2014/main" id="{19B47989-23BF-52F9-CC15-B5600A8E1679}"/>
+              </a:ext>
+            </a:extLst>
+          </p:cNvPr>
+          <p:cNvSpPr>
+            <a:spLocks noGrp="1"/>
+          </p:cNvSpPr>
+          <p:nvPr>
+            <p:ph type="title"/>
+          </p:nvPr>
+        </p:nvSpPr>
+        <p:spPr>
+          <a:xfrm>
+            <a:off x="526262" y="286045"/>
+            <a:ext cx="9144211" cy="1018032"/>
+          </a:xfrm>
+        </p:spPr>
+        <p:txBody>
+          <a:bodyPr/>
+          <a:lstStyle/>
+          <a:p>
+            <a:pPr algn="r" rtl="1"/>
+            <a:r>
+              <a:rPr lang="fa-IR" dirty="0"/>
+              <a:t>استفاده از متابخانه </a:t>
+            </a:r>
+            <a:r>
+              <a:rPr lang="en-US" dirty="0"/>
+              <a:t>datetime </a:t>
+            </a:r>
+            <a:r>
+              <a:rPr lang="fa-IR" dirty="0"/>
+              <a:t> </a:t>
+            </a:r>
+            <a:r>
+              <a:rPr lang="en-US" sz="2400" dirty="0"/>
+              <a:t>(</a:t>
+            </a:r>
+            <a:r>
+              <a:rPr lang="en-US" sz="2400" dirty="0" err="1"/>
+              <a:t>strptime</a:t>
+            </a:r>
+            <a:r>
+              <a:rPr lang="en-US" sz="2400" dirty="0"/>
+              <a:t>)</a:t>
+            </a:r>
+            <a:endParaRPr lang="en-US" dirty="0"/>
+          </a:p>
+        </p:txBody>
+      </p:sp>
+      <p:sp>
+        <p:nvSpPr>
+          <p:cNvPr id="3" name="Content Placeholder 2">
+            <a:extLst>
+              <a:ext uri="{FF2B5EF4-FFF2-40B4-BE49-F238E27FC236}">
+                <a16:creationId xmlns:a16="http://schemas.microsoft.com/office/drawing/2014/main" id="{D73F2F03-D491-452A-E0FA-7E7E196193ED}"/>
+              </a:ext>
+            </a:extLst>
+          </p:cNvPr>
+          <p:cNvSpPr>
+            <a:spLocks noGrp="1"/>
+          </p:cNvSpPr>
+          <p:nvPr>
+            <p:ph idx="1"/>
+          </p:nvPr>
+        </p:nvSpPr>
+        <p:spPr/>
+        <p:txBody>
+          <a:bodyPr>
+            <a:normAutofit/>
+          </a:bodyPr>
+          <a:lstStyle/>
+          <a:p>
+            <a:pPr algn="r" rtl="1"/>
+            <a:r>
+              <a:rPr lang="fa-IR" sz="2400" dirty="0">
+                <a:solidFill>
+                  <a:schemeClr val="tx1"/>
+                </a:solidFill>
+              </a:rPr>
+              <a:t>این تابع که زیر مجموعه </a:t>
+            </a:r>
+            <a:r>
+              <a:rPr lang="en-US" sz="2400" dirty="0">
+                <a:solidFill>
+                  <a:schemeClr val="tx1"/>
+                </a:solidFill>
+              </a:rPr>
+              <a:t>datetime</a:t>
+            </a:r>
+            <a:r>
+              <a:rPr lang="fa-IR" sz="2400" dirty="0">
+                <a:solidFill>
+                  <a:schemeClr val="tx1"/>
+                </a:solidFill>
+              </a:rPr>
+              <a:t> می باشد به شما اجازه تبدیل فرمت خای خاص تاریخ رو از استرینگ به </a:t>
+            </a:r>
+            <a:r>
+              <a:rPr lang="en-US" sz="2400" dirty="0">
+                <a:solidFill>
+                  <a:schemeClr val="tx1"/>
+                </a:solidFill>
+              </a:rPr>
+              <a:t>datetime</a:t>
+            </a:r>
+            <a:r>
+              <a:rPr lang="fa-IR" sz="2400" dirty="0">
+                <a:solidFill>
+                  <a:schemeClr val="tx1"/>
+                </a:solidFill>
+              </a:rPr>
+              <a:t> می دهد </a:t>
+            </a:r>
+            <a:endParaRPr lang="en-US" sz="2400" dirty="0">
+              <a:solidFill>
+                <a:schemeClr val="tx1"/>
+              </a:solidFill>
+            </a:endParaRPr>
+          </a:p>
+        </p:txBody>
+      </p:sp>
+      <p:pic>
+        <p:nvPicPr>
+          <p:cNvPr id="10" name="Picture 9">
+            <a:extLst>
+              <a:ext uri="{FF2B5EF4-FFF2-40B4-BE49-F238E27FC236}">
+                <a16:creationId xmlns:a16="http://schemas.microsoft.com/office/drawing/2014/main" id="{F5ED939A-0CC5-3CAE-092A-14F6A2BA67B2}"/>
+              </a:ext>
+            </a:extLst>
+          </p:cNvPr>
+          <p:cNvPicPr>
+            <a:picLocks noChangeAspect="1"/>
+          </p:cNvPicPr>
+          <p:nvPr/>
+        </p:nvPicPr>
+        <p:blipFill rotWithShape="1">
+          <a:blip r:embed="rId2"/>
+          <a:srcRect l="37197" t="28957" r="13561" b="16902"/>
+          <a:stretch/>
+        </p:blipFill>
+        <p:spPr>
+          <a:xfrm>
+            <a:off x="526262" y="2587517"/>
+            <a:ext cx="6003637" cy="3713018"/>
+          </a:xfrm>
+          <a:prstGeom prst="rect">
+            <a:avLst/>
+          </a:prstGeom>
+        </p:spPr>
+      </p:pic>
+      <p:pic>
+        <p:nvPicPr>
+          <p:cNvPr id="13" name="Picture 12">
+            <a:extLst>
+              <a:ext uri="{FF2B5EF4-FFF2-40B4-BE49-F238E27FC236}">
+                <a16:creationId xmlns:a16="http://schemas.microsoft.com/office/drawing/2014/main" id="{D97170AC-E61B-01BA-49B3-83514C3900A3}"/>
+              </a:ext>
+            </a:extLst>
+          </p:cNvPr>
+          <p:cNvPicPr>
+            <a:picLocks noChangeAspect="1"/>
+          </p:cNvPicPr>
+          <p:nvPr/>
+        </p:nvPicPr>
+        <p:blipFill rotWithShape="1">
+          <a:blip r:embed="rId3"/>
+          <a:srcRect l="5228" t="10774" r="59924" b="60944"/>
+          <a:stretch/>
+        </p:blipFill>
+        <p:spPr>
+          <a:xfrm>
+            <a:off x="7278255" y="2817090"/>
+            <a:ext cx="4248728" cy="1939637"/>
+          </a:xfrm>
+          <a:prstGeom prst="rect">
+            <a:avLst/>
+          </a:prstGeom>
+        </p:spPr>
+      </p:pic>
+      <p:sp>
+        <p:nvSpPr>
+          <p:cNvPr id="14" name="TextBox 13">
+            <a:extLst>
+              <a:ext uri="{FF2B5EF4-FFF2-40B4-BE49-F238E27FC236}">
+                <a16:creationId xmlns:a16="http://schemas.microsoft.com/office/drawing/2014/main" id="{3B0977D8-5AE7-26FD-2C52-982791C36025}"/>
+              </a:ext>
+            </a:extLst>
+          </p:cNvPr>
+          <p:cNvSpPr txBox="1"/>
+          <p:nvPr/>
+        </p:nvSpPr>
+        <p:spPr>
+          <a:xfrm>
+            <a:off x="7370618" y="4913745"/>
+            <a:ext cx="4064000" cy="369332"/>
+          </a:xfrm>
+          <a:prstGeom prst="rect">
+            <a:avLst/>
+          </a:prstGeom>
+          <a:noFill/>
+        </p:spPr>
+        <p:txBody>
+          <a:bodyPr wrap="square" rtlCol="0">
+            <a:spAutoFit/>
+          </a:bodyPr>
+          <a:lstStyle/>
+          <a:p>
+            <a:pPr algn="r" rtl="1"/>
+            <a:r>
+              <a:rPr lang="fa-IR" dirty="0"/>
+              <a:t>امکان جمع و منها کردن مستقیم تاریخ ها </a:t>
+            </a:r>
+            <a:endParaRPr lang="en-US" dirty="0"/>
+          </a:p>
+        </p:txBody>
+      </p:sp>
+      <p:sp>
+        <p:nvSpPr>
+          <p:cNvPr id="4" name="TextBox 3">
+            <a:extLst>
+              <a:ext uri="{FF2B5EF4-FFF2-40B4-BE49-F238E27FC236}">
+                <a16:creationId xmlns:a16="http://schemas.microsoft.com/office/drawing/2014/main" id="{0A6FF779-ED39-72ED-EB1C-2272987C4A59}"/>
+              </a:ext>
+            </a:extLst>
+          </p:cNvPr>
+          <p:cNvSpPr txBox="1"/>
+          <p:nvPr/>
+        </p:nvSpPr>
+        <p:spPr>
+          <a:xfrm>
+            <a:off x="7564582" y="5384800"/>
+            <a:ext cx="4101156" cy="369332"/>
+          </a:xfrm>
+          <a:prstGeom prst="rect">
+            <a:avLst/>
+          </a:prstGeom>
+          <a:noFill/>
+        </p:spPr>
+        <p:txBody>
+          <a:bodyPr wrap="square" rtlCol="0">
+            <a:spAutoFit/>
+          </a:bodyPr>
+          <a:lstStyle/>
+          <a:p>
+            <a:pPr algn="r" rtl="1"/>
+            <a:r>
+              <a:rPr lang="fa-IR" dirty="0">
+                <a:hlinkClick r:id="rId4"/>
+              </a:rPr>
+              <a:t>کاربرد های دیگر </a:t>
+            </a:r>
+            <a:r>
+              <a:rPr lang="en-US" dirty="0">
+                <a:hlinkClick r:id="rId4"/>
+              </a:rPr>
+              <a:t>datetime</a:t>
+            </a:r>
+            <a:endParaRPr lang="en-US" dirty="0"/>
+          </a:p>
+        </p:txBody>
+      </p:sp>
+    </p:spTree>
+    <p:extLst>
+      <p:ext uri="{BB962C8B-B14F-4D97-AF65-F5344CB8AC3E}">
+        <p14:creationId xmlns:p14="http://schemas.microsoft.com/office/powerpoint/2010/main" val="2039754657"/>
       </p:ext>
     </p:extLst>
   </p:cSld>

</xml_diff>